<commit_message>
Comitting changes to figures names
</commit_message>
<xml_diff>
--- a/manuscript/Figures/Results_Obs_CaseStudy_CR.pptx
+++ b/manuscript/Figures/Results_Obs_CaseStudy_CR.pptx
@@ -2002,12 +2002,12 @@
   <pc:docChgLst>
     <pc:chgData name="Fatima Pillosu" userId="a6295d4dc9e22643" providerId="LiveId" clId="{1BC80925-931B-48F4-B58F-B83AAFB201B0}"/>
     <pc:docChg chg="undo custSel modSld">
-      <pc:chgData name="Fatima Pillosu" userId="a6295d4dc9e22643" providerId="LiveId" clId="{1BC80925-931B-48F4-B58F-B83AAFB201B0}" dt="2021-01-22T15:49:00.306" v="13" actId="1037"/>
+      <pc:chgData name="Fatima Pillosu" userId="a6295d4dc9e22643" providerId="LiveId" clId="{1BC80925-931B-48F4-B58F-B83AAFB201B0}" dt="2021-01-22T16:07:29.278" v="48" actId="14100"/>
       <pc:docMkLst>
         <pc:docMk/>
       </pc:docMkLst>
       <pc:sldChg chg="addSp delSp modSp mod">
-        <pc:chgData name="Fatima Pillosu" userId="a6295d4dc9e22643" providerId="LiveId" clId="{1BC80925-931B-48F4-B58F-B83AAFB201B0}" dt="2021-01-22T15:49:00.306" v="13" actId="1037"/>
+        <pc:chgData name="Fatima Pillosu" userId="a6295d4dc9e22643" providerId="LiveId" clId="{1BC80925-931B-48F4-B58F-B83AAFB201B0}" dt="2021-01-22T16:07:29.278" v="48" actId="14100"/>
         <pc:sldMkLst>
           <pc:docMk/>
           <pc:sldMk cId="463016531" sldId="263"/>
@@ -2117,7 +2117,7 @@
           </ac:spMkLst>
         </pc:spChg>
         <pc:spChg chg="add mod">
-          <ac:chgData name="Fatima Pillosu" userId="a6295d4dc9e22643" providerId="LiveId" clId="{1BC80925-931B-48F4-B58F-B83AAFB201B0}" dt="2021-01-22T15:49:00.306" v="13" actId="1037"/>
+          <ac:chgData name="Fatima Pillosu" userId="a6295d4dc9e22643" providerId="LiveId" clId="{1BC80925-931B-48F4-B58F-B83AAFB201B0}" dt="2021-01-22T16:06:59.804" v="41" actId="1076"/>
           <ac:spMkLst>
             <pc:docMk/>
             <pc:sldMk cId="463016531" sldId="263"/>
@@ -2477,7 +2477,7 @@
           </ac:spMkLst>
         </pc:spChg>
         <pc:spChg chg="add mod">
-          <ac:chgData name="Fatima Pillosu" userId="a6295d4dc9e22643" providerId="LiveId" clId="{1BC80925-931B-48F4-B58F-B83AAFB201B0}" dt="2021-01-22T15:49:00.306" v="13" actId="1037"/>
+          <ac:chgData name="Fatima Pillosu" userId="a6295d4dc9e22643" providerId="LiveId" clId="{1BC80925-931B-48F4-B58F-B83AAFB201B0}" dt="2021-01-22T16:07:09.023" v="42" actId="1076"/>
           <ac:spMkLst>
             <pc:docMk/>
             <pc:sldMk cId="463016531" sldId="263"/>
@@ -2485,7 +2485,7 @@
           </ac:spMkLst>
         </pc:spChg>
         <pc:spChg chg="add mod">
-          <ac:chgData name="Fatima Pillosu" userId="a6295d4dc9e22643" providerId="LiveId" clId="{1BC80925-931B-48F4-B58F-B83AAFB201B0}" dt="2021-01-22T15:49:00.306" v="13" actId="1037"/>
+          <ac:chgData name="Fatima Pillosu" userId="a6295d4dc9e22643" providerId="LiveId" clId="{1BC80925-931B-48F4-B58F-B83AAFB201B0}" dt="2021-01-22T16:07:14.010" v="43" actId="14100"/>
           <ac:spMkLst>
             <pc:docMk/>
             <pc:sldMk cId="463016531" sldId="263"/>
@@ -2493,7 +2493,7 @@
           </ac:spMkLst>
         </pc:spChg>
         <pc:spChg chg="add mod">
-          <ac:chgData name="Fatima Pillosu" userId="a6295d4dc9e22643" providerId="LiveId" clId="{1BC80925-931B-48F4-B58F-B83AAFB201B0}" dt="2021-01-22T15:49:00.306" v="13" actId="1037"/>
+          <ac:chgData name="Fatima Pillosu" userId="a6295d4dc9e22643" providerId="LiveId" clId="{1BC80925-931B-48F4-B58F-B83AAFB201B0}" dt="2021-01-22T16:07:23.198" v="46" actId="14100"/>
           <ac:spMkLst>
             <pc:docMk/>
             <pc:sldMk cId="463016531" sldId="263"/>
@@ -2501,7 +2501,7 @@
           </ac:spMkLst>
         </pc:spChg>
         <pc:spChg chg="add mod">
-          <ac:chgData name="Fatima Pillosu" userId="a6295d4dc9e22643" providerId="LiveId" clId="{1BC80925-931B-48F4-B58F-B83AAFB201B0}" dt="2021-01-22T15:49:00.306" v="13" actId="1037"/>
+          <ac:chgData name="Fatima Pillosu" userId="a6295d4dc9e22643" providerId="LiveId" clId="{1BC80925-931B-48F4-B58F-B83AAFB201B0}" dt="2021-01-22T16:07:17.294" v="44" actId="14100"/>
           <ac:spMkLst>
             <pc:docMk/>
             <pc:sldMk cId="463016531" sldId="263"/>
@@ -2509,7 +2509,7 @@
           </ac:spMkLst>
         </pc:spChg>
         <pc:spChg chg="add mod">
-          <ac:chgData name="Fatima Pillosu" userId="a6295d4dc9e22643" providerId="LiveId" clId="{1BC80925-931B-48F4-B58F-B83AAFB201B0}" dt="2021-01-22T15:49:00.306" v="13" actId="1037"/>
+          <ac:chgData name="Fatima Pillosu" userId="a6295d4dc9e22643" providerId="LiveId" clId="{1BC80925-931B-48F4-B58F-B83AAFB201B0}" dt="2021-01-22T16:07:29.278" v="48" actId="14100"/>
           <ac:spMkLst>
             <pc:docMk/>
             <pc:sldMk cId="463016531" sldId="263"/>
@@ -6031,8 +6031,8 @@
         </p:nvSpPr>
         <p:spPr>
           <a:xfrm>
-            <a:off x="2057783" y="674821"/>
-            <a:ext cx="434119" cy="276999"/>
+            <a:off x="2239902" y="657498"/>
+            <a:ext cx="252000" cy="276999"/>
           </a:xfrm>
           <a:prstGeom prst="rect">
             <a:avLst/>
@@ -6055,7 +6055,7 @@
             <a:pPr algn="ctr"/>
             <a:r>
               <a:rPr lang="es-ES" sz="1200" b="1" dirty="0"/>
-              <a:t>O-1</a:t>
+              <a:t>a</a:t>
             </a:r>
             <a:endParaRPr lang="en-GB" sz="1200" b="1" dirty="0"/>
           </a:p>
@@ -6550,8 +6550,8 @@
         </p:nvSpPr>
         <p:spPr>
           <a:xfrm>
-            <a:off x="4586776" y="657498"/>
-            <a:ext cx="434119" cy="276999"/>
+            <a:off x="4795525" y="651843"/>
+            <a:ext cx="253079" cy="276999"/>
           </a:xfrm>
           <a:prstGeom prst="rect">
             <a:avLst/>
@@ -6574,7 +6574,7 @@
             <a:pPr algn="ctr"/>
             <a:r>
               <a:rPr lang="es-ES" sz="1200" b="1" dirty="0"/>
-              <a:t>O-2</a:t>
+              <a:t>b</a:t>
             </a:r>
             <a:endParaRPr lang="en-GB" sz="1200" b="1" dirty="0"/>
           </a:p>
@@ -6594,8 +6594,8 @@
         </p:nvSpPr>
         <p:spPr>
           <a:xfrm>
-            <a:off x="2057783" y="3007190"/>
-            <a:ext cx="434119" cy="276999"/>
+            <a:off x="2239902" y="3007190"/>
+            <a:ext cx="252000" cy="276999"/>
           </a:xfrm>
           <a:prstGeom prst="rect">
             <a:avLst/>
@@ -6618,7 +6618,7 @@
             <a:pPr algn="ctr"/>
             <a:r>
               <a:rPr lang="es-ES" sz="1200" b="1" dirty="0"/>
-              <a:t>O-3</a:t>
+              <a:t>c</a:t>
             </a:r>
             <a:endParaRPr lang="en-GB" sz="1200" b="1" dirty="0"/>
           </a:p>
@@ -6638,8 +6638,8 @@
         </p:nvSpPr>
         <p:spPr>
           <a:xfrm>
-            <a:off x="4586776" y="2989867"/>
-            <a:ext cx="434119" cy="276999"/>
+            <a:off x="4795525" y="3007189"/>
+            <a:ext cx="253079" cy="276999"/>
           </a:xfrm>
           <a:prstGeom prst="rect">
             <a:avLst/>
@@ -6662,7 +6662,7 @@
             <a:pPr algn="ctr"/>
             <a:r>
               <a:rPr lang="es-ES" sz="1200" b="1" dirty="0"/>
-              <a:t>O-4</a:t>
+              <a:t>d</a:t>
             </a:r>
             <a:endParaRPr lang="en-GB" sz="1200" b="1" dirty="0"/>
           </a:p>
@@ -6682,8 +6682,8 @@
         </p:nvSpPr>
         <p:spPr>
           <a:xfrm>
-            <a:off x="2057783" y="5365880"/>
-            <a:ext cx="434119" cy="276999"/>
+            <a:off x="2239902" y="5365880"/>
+            <a:ext cx="252000" cy="276999"/>
           </a:xfrm>
           <a:prstGeom prst="rect">
             <a:avLst/>
@@ -6706,7 +6706,7 @@
             <a:pPr algn="ctr"/>
             <a:r>
               <a:rPr lang="es-ES" sz="1200" b="1" dirty="0"/>
-              <a:t>O-5</a:t>
+              <a:t>e</a:t>
             </a:r>
             <a:endParaRPr lang="en-GB" sz="1200" b="1" dirty="0"/>
           </a:p>
@@ -6726,8 +6726,8 @@
         </p:nvSpPr>
         <p:spPr>
           <a:xfrm>
-            <a:off x="4586776" y="5348557"/>
-            <a:ext cx="434119" cy="276999"/>
+            <a:off x="4795525" y="5365880"/>
+            <a:ext cx="253079" cy="276999"/>
           </a:xfrm>
           <a:prstGeom prst="rect">
             <a:avLst/>
@@ -6750,7 +6750,7 @@
             <a:pPr algn="ctr"/>
             <a:r>
               <a:rPr lang="es-ES" sz="1200" b="1" dirty="0"/>
-              <a:t>O-6</a:t>
+              <a:t>f</a:t>
             </a:r>
             <a:endParaRPr lang="en-GB" sz="1200" b="1" dirty="0"/>
           </a:p>

</xml_diff>